<commit_message>
Another Change to pptx
</commit_message>
<xml_diff>
--- a/Praktikum ASP – Team 15.pptx
+++ b/Praktikum ASP – Team 15.pptx
@@ -9703,7 +9703,7 @@
         </p:nvGrpSpPr>
         <p:grpSpPr>
           <a:xfrm>
-            <a:off x="2597468" y="1838605"/>
+            <a:off x="2597468" y="1890689"/>
             <a:ext cx="3949064" cy="3949064"/>
             <a:chOff x="2531520" y="1869982"/>
             <a:chExt cx="3949064" cy="3949064"/>
@@ -12992,8 +12992,8 @@
           <a:lstStyle/>
           <a:p>
             <a:r>
-              <a:rPr lang="de-DE"/>
-              <a:t>Dr. rer. nat. Erika Mustermann (TUM) | kann beliebig erweitert werden | Infos mit Strich trennen</a:t>
+              <a:rPr lang="de-DE" dirty="0"/>
+              <a:t>Saman Miran | Robin Ostner | Maria Schulze</a:t>
             </a:r>
             <a:endParaRPr lang="en-US" dirty="0"/>
           </a:p>
@@ -14870,7 +14870,7 @@
           <a:graphicData uri="http://schemas.openxmlformats.org/presentationml/2006/ole">
             <mc:AlternateContent xmlns:mc="http://schemas.openxmlformats.org/markup-compatibility/2006">
               <mc:Choice xmlns:v="urn:schemas-microsoft-com:vml" Requires="v">
-                <p:oleObj spid="_x0000_s1030" name="Image" r:id="rId4" imgW="2437920" imgH="2437920" progId="Photoshop.Image.18">
+                <p:oleObj spid="_x0000_s1032" name="Image" r:id="rId4" imgW="2437920" imgH="2437920" progId="Photoshop.Image.18">
                   <p:embed/>
                 </p:oleObj>
               </mc:Choice>
@@ -14933,7 +14933,7 @@
           <a:graphicData uri="http://schemas.openxmlformats.org/presentationml/2006/ole">
             <mc:AlternateContent xmlns:mc="http://schemas.openxmlformats.org/markup-compatibility/2006">
               <mc:Choice xmlns:v="urn:schemas-microsoft-com:vml" Requires="v">
-                <p:oleObj spid="_x0000_s1031" name="Image" r:id="rId6" imgW="2437920" imgH="2437920" progId="Photoshop.Image.18">
+                <p:oleObj spid="_x0000_s1033" name="Image" r:id="rId6" imgW="2437920" imgH="2437920" progId="Photoshop.Image.18">
                   <p:embed/>
                 </p:oleObj>
               </mc:Choice>

</xml_diff>